<commit_message>
Update flowchart & presentation
</commit_message>
<xml_diff>
--- a/Presentation/Battleship game project - Module 1 Eric x Ting.pptx
+++ b/Presentation/Battleship game project - Module 1 Eric x Ting.pptx
@@ -1061,7 +1061,7 @@
         </p:nvSpPr>
         <p:spPr>
           <a:xfrm>
-            <a:off x="381300" y="685800"/>
+            <a:off x="381000" y="685800"/>
             <a:ext cx="6096000" cy="3429000"/>
           </a:xfrm>
           <a:custGeom>
@@ -8320,30 +8320,32 @@
       </p:pic>
       <p:pic>
         <p:nvPicPr>
-          <p:cNvPr id="82" name="Google Shape;82;p16"/>
-          <p:cNvPicPr preferRelativeResize="0"/>
+          <p:cNvPr id="3" name="Image 2">
+            <a:extLst>
+              <a:ext uri="{FF2B5EF4-FFF2-40B4-BE49-F238E27FC236}">
+                <a16:creationId xmlns:a16="http://schemas.microsoft.com/office/drawing/2014/main" id="{F5161DAF-BF02-0047-9A65-1051099C4816}"/>
+              </a:ext>
+            </a:extLst>
+          </p:cNvPr>
+          <p:cNvPicPr>
+            <a:picLocks noChangeAspect="1"/>
+          </p:cNvPicPr>
           <p:nvPr/>
         </p:nvPicPr>
         <p:blipFill>
-          <a:blip r:embed="rId4">
-            <a:alphaModFix/>
-          </a:blip>
+          <a:blip r:embed="rId4"/>
           <a:stretch>
             <a:fillRect/>
           </a:stretch>
         </p:blipFill>
         <p:spPr>
           <a:xfrm>
-            <a:off x="2471550" y="106800"/>
-            <a:ext cx="4502250" cy="4877924"/>
+            <a:off x="1646633" y="0"/>
+            <a:ext cx="5735041" cy="5041794"/>
           </a:xfrm>
           <a:prstGeom prst="rect">
             <a:avLst/>
           </a:prstGeom>
-          <a:noFill/>
-          <a:ln>
-            <a:noFill/>
-          </a:ln>
         </p:spPr>
       </p:pic>
     </p:spTree>

</xml_diff>